<commit_message>
Add figures for WCET model.
</commit_message>
<xml_diff>
--- a/monitoring_wcet/figs_src/diagrams-wide.pptx
+++ b/monitoring_wcet/figs_src/diagrams-wide.pptx
@@ -7,6 +7,7 @@
   <p:sldIdLst>
     <p:sldId id="256" r:id="rId2"/>
     <p:sldId id="257" r:id="rId3"/>
+    <p:sldId id="258" r:id="rId4"/>
   </p:sldIdLst>
   <p:sldSz cx="5303838" cy="10058400"/>
   <p:notesSz cx="4845050" cy="9601200"/>
@@ -289,7 +290,7 @@
           <a:p>
             <a:fld id="{D9DE92D4-3454-4E80-9822-1258D18FA6E8}" type="datetimeFigureOut">
               <a:rPr lang="en-US" smtClean="0"/>
-              <a:t>1/18/2015</a:t>
+              <a:t>1/21/2015</a:t>
             </a:fld>
             <a:endParaRPr lang="en-US"/>
           </a:p>
@@ -459,7 +460,7 @@
           <a:p>
             <a:fld id="{D9DE92D4-3454-4E80-9822-1258D18FA6E8}" type="datetimeFigureOut">
               <a:rPr lang="en-US" smtClean="0"/>
-              <a:t>1/18/2015</a:t>
+              <a:t>1/21/2015</a:t>
             </a:fld>
             <a:endParaRPr lang="en-US"/>
           </a:p>
@@ -639,7 +640,7 @@
           <a:p>
             <a:fld id="{D9DE92D4-3454-4E80-9822-1258D18FA6E8}" type="datetimeFigureOut">
               <a:rPr lang="en-US" smtClean="0"/>
-              <a:t>1/18/2015</a:t>
+              <a:t>1/21/2015</a:t>
             </a:fld>
             <a:endParaRPr lang="en-US"/>
           </a:p>
@@ -809,7 +810,7 @@
           <a:p>
             <a:fld id="{D9DE92D4-3454-4E80-9822-1258D18FA6E8}" type="datetimeFigureOut">
               <a:rPr lang="en-US" smtClean="0"/>
-              <a:t>1/18/2015</a:t>
+              <a:t>1/21/2015</a:t>
             </a:fld>
             <a:endParaRPr lang="en-US"/>
           </a:p>
@@ -1055,7 +1056,7 @@
           <a:p>
             <a:fld id="{D9DE92D4-3454-4E80-9822-1258D18FA6E8}" type="datetimeFigureOut">
               <a:rPr lang="en-US" smtClean="0"/>
-              <a:t>1/18/2015</a:t>
+              <a:t>1/21/2015</a:t>
             </a:fld>
             <a:endParaRPr lang="en-US"/>
           </a:p>
@@ -1343,7 +1344,7 @@
           <a:p>
             <a:fld id="{D9DE92D4-3454-4E80-9822-1258D18FA6E8}" type="datetimeFigureOut">
               <a:rPr lang="en-US" smtClean="0"/>
-              <a:t>1/18/2015</a:t>
+              <a:t>1/21/2015</a:t>
             </a:fld>
             <a:endParaRPr lang="en-US"/>
           </a:p>
@@ -1770,7 +1771,7 @@
           <a:p>
             <a:fld id="{D9DE92D4-3454-4E80-9822-1258D18FA6E8}" type="datetimeFigureOut">
               <a:rPr lang="en-US" smtClean="0"/>
-              <a:t>1/18/2015</a:t>
+              <a:t>1/21/2015</a:t>
             </a:fld>
             <a:endParaRPr lang="en-US"/>
           </a:p>
@@ -1888,7 +1889,7 @@
           <a:p>
             <a:fld id="{D9DE92D4-3454-4E80-9822-1258D18FA6E8}" type="datetimeFigureOut">
               <a:rPr lang="en-US" smtClean="0"/>
-              <a:t>1/18/2015</a:t>
+              <a:t>1/21/2015</a:t>
             </a:fld>
             <a:endParaRPr lang="en-US"/>
           </a:p>
@@ -1983,7 +1984,7 @@
           <a:p>
             <a:fld id="{D9DE92D4-3454-4E80-9822-1258D18FA6E8}" type="datetimeFigureOut">
               <a:rPr lang="en-US" smtClean="0"/>
-              <a:t>1/18/2015</a:t>
+              <a:t>1/21/2015</a:t>
             </a:fld>
             <a:endParaRPr lang="en-US"/>
           </a:p>
@@ -2260,7 +2261,7 @@
           <a:p>
             <a:fld id="{D9DE92D4-3454-4E80-9822-1258D18FA6E8}" type="datetimeFigureOut">
               <a:rPr lang="en-US" smtClean="0"/>
-              <a:t>1/18/2015</a:t>
+              <a:t>1/21/2015</a:t>
             </a:fld>
             <a:endParaRPr lang="en-US"/>
           </a:p>
@@ -2513,7 +2514,7 @@
           <a:p>
             <a:fld id="{D9DE92D4-3454-4E80-9822-1258D18FA6E8}" type="datetimeFigureOut">
               <a:rPr lang="en-US" smtClean="0"/>
-              <a:t>1/18/2015</a:t>
+              <a:t>1/21/2015</a:t>
             </a:fld>
             <a:endParaRPr lang="en-US"/>
           </a:p>
@@ -2726,7 +2727,7 @@
           <a:p>
             <a:fld id="{D9DE92D4-3454-4E80-9822-1258D18FA6E8}" type="datetimeFigureOut">
               <a:rPr lang="en-US" smtClean="0"/>
-              <a:t>1/18/2015</a:t>
+              <a:t>1/21/2015</a:t>
             </a:fld>
             <a:endParaRPr lang="en-US"/>
           </a:p>
@@ -4339,21 +4340,7 @@
                 <a:latin typeface="Consolas" pitchFamily="49" charset="0"/>
                 <a:cs typeface="Consolas" pitchFamily="49" charset="0"/>
               </a:rPr>
-              <a:t>  </a:t>
-            </a:r>
-            <a:r>
-              <a:rPr lang="en-US" sz="600" dirty="0" smtClean="0">
-                <a:latin typeface="Consolas" pitchFamily="49" charset="0"/>
-                <a:cs typeface="Consolas" pitchFamily="49" charset="0"/>
-              </a:rPr>
-              <a:t>; return </a:t>
-            </a:r>
-            <a:r>
-              <a:rPr lang="en-US" sz="600" dirty="0" smtClean="0">
-                <a:latin typeface="Consolas" pitchFamily="49" charset="0"/>
-                <a:cs typeface="Consolas" pitchFamily="49" charset="0"/>
-              </a:rPr>
-              <a:t>pointer 0x12340000 in r1</a:t>
+              <a:t>  ; return pointer 0x12340000 in r1</a:t>
             </a:r>
           </a:p>
           <a:p>
@@ -4368,14 +4355,7 @@
                 <a:latin typeface="Consolas" pitchFamily="49" charset="0"/>
                 <a:cs typeface="Consolas" pitchFamily="49" charset="0"/>
               </a:rPr>
-              <a:t>2</a:t>
-            </a:r>
-            <a:r>
-              <a:rPr lang="en-US" sz="600" dirty="0" smtClean="0">
-                <a:latin typeface="Consolas" pitchFamily="49" charset="0"/>
-                <a:cs typeface="Consolas" pitchFamily="49" charset="0"/>
-              </a:rPr>
-              <a:t>: add r2, r1, #8</a:t>
+              <a:t>2: add r2, r1, #8</a:t>
             </a:r>
           </a:p>
           <a:p>
@@ -4435,40 +4415,40 @@
               </a:rPr>
               <a:t> r3, [r1, #12] </a:t>
             </a:r>
+          </a:p>
+          <a:p>
+            <a:r>
+              <a:rPr lang="en-US" sz="600" dirty="0">
+                <a:latin typeface="Consolas" pitchFamily="49" charset="0"/>
+                <a:cs typeface="Consolas" pitchFamily="49" charset="0"/>
+              </a:rPr>
+              <a:t> </a:t>
+            </a:r>
+            <a:r>
+              <a:rPr lang="en-US" sz="600" dirty="0" smtClean="0">
+                <a:latin typeface="Consolas" pitchFamily="49" charset="0"/>
+                <a:cs typeface="Consolas" pitchFamily="49" charset="0"/>
+              </a:rPr>
+              <a:t>   ; store to 0x1234000c</a:t>
+            </a:r>
+          </a:p>
+          <a:p>
+            <a:endParaRPr lang="en-US" sz="600" dirty="0">
+              <a:latin typeface="Consolas" pitchFamily="49" charset="0"/>
+              <a:cs typeface="Consolas" pitchFamily="49" charset="0"/>
+            </a:endParaRPr>
+          </a:p>
+          <a:p>
             <a:endParaRPr lang="en-US" sz="600" dirty="0" smtClean="0">
               <a:latin typeface="Consolas" pitchFamily="49" charset="0"/>
               <a:cs typeface="Consolas" pitchFamily="49" charset="0"/>
             </a:endParaRPr>
           </a:p>
           <a:p>
-            <a:r>
-              <a:rPr lang="en-US" sz="600" dirty="0">
-                <a:latin typeface="Consolas" pitchFamily="49" charset="0"/>
-                <a:cs typeface="Consolas" pitchFamily="49" charset="0"/>
-              </a:rPr>
-              <a:t> </a:t>
-            </a:r>
-            <a:r>
-              <a:rPr lang="en-US" sz="600" dirty="0" smtClean="0">
-                <a:latin typeface="Consolas" pitchFamily="49" charset="0"/>
-                <a:cs typeface="Consolas" pitchFamily="49" charset="0"/>
-              </a:rPr>
-              <a:t>   </a:t>
-            </a:r>
-            <a:r>
-              <a:rPr lang="en-US" sz="600" dirty="0" smtClean="0">
-                <a:latin typeface="Consolas" pitchFamily="49" charset="0"/>
-                <a:cs typeface="Consolas" pitchFamily="49" charset="0"/>
-              </a:rPr>
-              <a:t>; </a:t>
-            </a:r>
-            <a:r>
-              <a:rPr lang="en-US" sz="600" dirty="0" smtClean="0">
-                <a:latin typeface="Consolas" pitchFamily="49" charset="0"/>
-                <a:cs typeface="Consolas" pitchFamily="49" charset="0"/>
-              </a:rPr>
-              <a:t>store to 0x1234000c</a:t>
-            </a:r>
+            <a:endParaRPr lang="en-US" sz="600" dirty="0" smtClean="0">
+              <a:latin typeface="Consolas" pitchFamily="49" charset="0"/>
+              <a:cs typeface="Consolas" pitchFamily="49" charset="0"/>
+            </a:endParaRPr>
           </a:p>
           <a:p>
             <a:endParaRPr lang="en-US" sz="600" dirty="0">
@@ -4477,85 +4457,42 @@
             </a:endParaRPr>
           </a:p>
           <a:p>
-            <a:endParaRPr lang="en-US" sz="600" dirty="0" smtClean="0">
-              <a:latin typeface="Consolas" pitchFamily="49" charset="0"/>
-              <a:cs typeface="Consolas" pitchFamily="49" charset="0"/>
-            </a:endParaRPr>
-          </a:p>
-          <a:p>
-            <a:endParaRPr lang="en-US" sz="600" dirty="0" smtClean="0">
-              <a:latin typeface="Consolas" pitchFamily="49" charset="0"/>
-              <a:cs typeface="Consolas" pitchFamily="49" charset="0"/>
-            </a:endParaRPr>
-          </a:p>
-          <a:p>
-            <a:endParaRPr lang="en-US" sz="600" dirty="0">
-              <a:latin typeface="Consolas" pitchFamily="49" charset="0"/>
-              <a:cs typeface="Consolas" pitchFamily="49" charset="0"/>
-            </a:endParaRPr>
-          </a:p>
-          <a:p>
             <a:r>
               <a:rPr lang="en-US" sz="600" dirty="0" smtClean="0">
                 <a:latin typeface="Consolas" pitchFamily="49" charset="0"/>
                 <a:cs typeface="Consolas" pitchFamily="49" charset="0"/>
               </a:rPr>
-              <a:t>4</a:t>
+              <a:t>4: </a:t>
+            </a:r>
+            <a:r>
+              <a:rPr lang="en-US" sz="600" dirty="0" err="1" smtClean="0">
+                <a:latin typeface="Consolas" pitchFamily="49" charset="0"/>
+                <a:cs typeface="Consolas" pitchFamily="49" charset="0"/>
+              </a:rPr>
+              <a:t>str</a:t>
             </a:r>
             <a:r>
               <a:rPr lang="en-US" sz="600" dirty="0" smtClean="0">
                 <a:latin typeface="Consolas" pitchFamily="49" charset="0"/>
                 <a:cs typeface="Consolas" pitchFamily="49" charset="0"/>
               </a:rPr>
-              <a:t>: </a:t>
-            </a:r>
-            <a:r>
-              <a:rPr lang="en-US" sz="600" dirty="0" err="1" smtClean="0">
+              <a:t> r3, [r2, #12] </a:t>
+            </a:r>
+          </a:p>
+          <a:p>
+            <a:r>
+              <a:rPr lang="en-US" sz="600" dirty="0">
                 <a:latin typeface="Consolas" pitchFamily="49" charset="0"/>
                 <a:cs typeface="Consolas" pitchFamily="49" charset="0"/>
               </a:rPr>
-              <a:t>str</a:t>
+              <a:t> </a:t>
             </a:r>
             <a:r>
               <a:rPr lang="en-US" sz="600" dirty="0" smtClean="0">
                 <a:latin typeface="Consolas" pitchFamily="49" charset="0"/>
                 <a:cs typeface="Consolas" pitchFamily="49" charset="0"/>
               </a:rPr>
-              <a:t> r3, [r2, #12] </a:t>
-            </a:r>
-            <a:endParaRPr lang="en-US" sz="600" dirty="0" smtClean="0">
-              <a:latin typeface="Consolas" pitchFamily="49" charset="0"/>
-              <a:cs typeface="Consolas" pitchFamily="49" charset="0"/>
-            </a:endParaRPr>
-          </a:p>
-          <a:p>
-            <a:r>
-              <a:rPr lang="en-US" sz="600" dirty="0">
-                <a:latin typeface="Consolas" pitchFamily="49" charset="0"/>
-                <a:cs typeface="Consolas" pitchFamily="49" charset="0"/>
-              </a:rPr>
-              <a:t> </a:t>
-            </a:r>
-            <a:r>
-              <a:rPr lang="en-US" sz="600" dirty="0" smtClean="0">
-                <a:latin typeface="Consolas" pitchFamily="49" charset="0"/>
-                <a:cs typeface="Consolas" pitchFamily="49" charset="0"/>
-              </a:rPr>
-              <a:t>  </a:t>
-            </a:r>
-            <a:r>
-              <a:rPr lang="en-US" sz="600" dirty="0" smtClean="0">
-                <a:latin typeface="Consolas" pitchFamily="49" charset="0"/>
-                <a:cs typeface="Consolas" pitchFamily="49" charset="0"/>
-              </a:rPr>
-              <a:t>; </a:t>
-            </a:r>
-            <a:r>
-              <a:rPr lang="en-US" sz="600" dirty="0" smtClean="0">
-                <a:latin typeface="Consolas" pitchFamily="49" charset="0"/>
-                <a:cs typeface="Consolas" pitchFamily="49" charset="0"/>
-              </a:rPr>
-              <a:t>store to 0x12340014</a:t>
+              <a:t>  ; store to 0x12340014</a:t>
             </a:r>
             <a:endParaRPr lang="en-US" sz="600" dirty="0">
               <a:latin typeface="Consolas" pitchFamily="49" charset="0"/>
@@ -5315,6 +5252,1992 @@
     <p:extLst>
       <p:ext uri="{BB962C8B-B14F-4D97-AF65-F5344CB8AC3E}">
         <p14:creationId xmlns:p14="http://schemas.microsoft.com/office/powerpoint/2010/main" val="462151892"/>
+      </p:ext>
+    </p:extLst>
+  </p:cSld>
+  <p:clrMapOvr>
+    <a:masterClrMapping/>
+  </p:clrMapOvr>
+</p:sld>
+</file>
+
+<file path=ppt/slides/slide3.xml><?xml version="1.0" encoding="utf-8"?>
+<p:sld xmlns:a="http://schemas.openxmlformats.org/drawingml/2006/main" xmlns:r="http://schemas.openxmlformats.org/officeDocument/2006/relationships" xmlns:p="http://schemas.openxmlformats.org/presentationml/2006/main">
+  <p:cSld>
+    <p:spTree>
+      <p:nvGrpSpPr>
+        <p:cNvPr id="1" name=""/>
+        <p:cNvGrpSpPr/>
+        <p:nvPr/>
+      </p:nvGrpSpPr>
+      <p:grpSpPr>
+        <a:xfrm>
+          <a:off x="0" y="0"/>
+          <a:ext cx="0" cy="0"/>
+          <a:chOff x="0" y="0"/>
+          <a:chExt cx="0" cy="0"/>
+        </a:xfrm>
+      </p:grpSpPr>
+      <p:sp>
+        <p:nvSpPr>
+          <p:cNvPr id="2" name="Rectangle 1"/>
+          <p:cNvSpPr/>
+          <p:nvPr/>
+        </p:nvSpPr>
+        <p:spPr>
+          <a:xfrm>
+            <a:off x="2027238" y="677889"/>
+            <a:ext cx="838993" cy="161349"/>
+          </a:xfrm>
+          <a:prstGeom prst="rect">
+            <a:avLst/>
+          </a:prstGeom>
+          <a:solidFill>
+            <a:srgbClr val="FFFFCC"/>
+          </a:solidFill>
+          <a:ln w="12700">
+            <a:solidFill>
+              <a:schemeClr val="tx1"/>
+            </a:solidFill>
+          </a:ln>
+        </p:spPr>
+        <p:style>
+          <a:lnRef idx="2">
+            <a:schemeClr val="accent1">
+              <a:shade val="50000"/>
+            </a:schemeClr>
+          </a:lnRef>
+          <a:fillRef idx="1">
+            <a:schemeClr val="accent1"/>
+          </a:fillRef>
+          <a:effectRef idx="0">
+            <a:schemeClr val="accent1"/>
+          </a:effectRef>
+          <a:fontRef idx="minor">
+            <a:schemeClr val="lt1"/>
+          </a:fontRef>
+        </p:style>
+        <p:txBody>
+          <a:bodyPr rtlCol="0" anchor="ctr"/>
+          <a:lstStyle/>
+          <a:p>
+            <a:pPr algn="ctr"/>
+            <a:r>
+              <a:rPr lang="en-US" sz="800" dirty="0" smtClean="0">
+                <a:solidFill>
+                  <a:schemeClr val="tx1"/>
+                </a:solidFill>
+                <a:latin typeface="Arial" pitchFamily="34" charset="0"/>
+                <a:cs typeface="Arial" pitchFamily="34" charset="0"/>
+              </a:rPr>
+              <a:t>max</a:t>
+            </a:r>
+          </a:p>
+        </p:txBody>
+      </p:sp>
+      <p:cxnSp>
+        <p:nvCxnSpPr>
+          <p:cNvPr id="3" name="Straight Arrow Connector 2"/>
+          <p:cNvCxnSpPr>
+            <a:stCxn id="4" idx="2"/>
+          </p:cNvCxnSpPr>
+          <p:nvPr/>
+        </p:nvCxnSpPr>
+        <p:spPr>
+          <a:xfrm>
+            <a:off x="1851819" y="375450"/>
+            <a:ext cx="381000" cy="302439"/>
+          </a:xfrm>
+          <a:prstGeom prst="straightConnector1">
+            <a:avLst/>
+          </a:prstGeom>
+          <a:ln w="12700">
+            <a:solidFill>
+              <a:schemeClr val="tx1"/>
+            </a:solidFill>
+            <a:headEnd type="none" w="med" len="med"/>
+            <a:tailEnd type="triangle" w="med" len="med"/>
+          </a:ln>
+        </p:spPr>
+        <p:style>
+          <a:lnRef idx="1">
+            <a:schemeClr val="accent1"/>
+          </a:lnRef>
+          <a:fillRef idx="0">
+            <a:schemeClr val="accent1"/>
+          </a:fillRef>
+          <a:effectRef idx="0">
+            <a:schemeClr val="accent1"/>
+          </a:effectRef>
+          <a:fontRef idx="minor">
+            <a:schemeClr val="tx1"/>
+          </a:fontRef>
+        </p:style>
+      </p:cxnSp>
+      <p:sp>
+        <p:nvSpPr>
+          <p:cNvPr id="4" name="Rectangle 3"/>
+          <p:cNvSpPr/>
+          <p:nvPr/>
+        </p:nvSpPr>
+        <p:spPr>
+          <a:xfrm>
+            <a:off x="1661319" y="228599"/>
+            <a:ext cx="381000" cy="146851"/>
+          </a:xfrm>
+          <a:prstGeom prst="rect">
+            <a:avLst/>
+          </a:prstGeom>
+          <a:noFill/>
+          <a:ln w="12700">
+            <a:noFill/>
+          </a:ln>
+        </p:spPr>
+        <p:style>
+          <a:lnRef idx="2">
+            <a:schemeClr val="accent1">
+              <a:shade val="50000"/>
+            </a:schemeClr>
+          </a:lnRef>
+          <a:fillRef idx="1">
+            <a:schemeClr val="accent1"/>
+          </a:fillRef>
+          <a:effectRef idx="0">
+            <a:schemeClr val="accent1"/>
+          </a:effectRef>
+          <a:fontRef idx="minor">
+            <a:schemeClr val="lt1"/>
+          </a:fontRef>
+        </p:style>
+        <p:txBody>
+          <a:bodyPr rtlCol="0" anchor="ctr"/>
+          <a:lstStyle/>
+          <a:p>
+            <a:pPr algn="ctr"/>
+            <a:r>
+              <a:rPr lang="en-US" sz="800" dirty="0" smtClean="0">
+                <a:solidFill>
+                  <a:schemeClr val="tx1"/>
+                </a:solidFill>
+                <a:latin typeface="Arial" pitchFamily="34" charset="0"/>
+                <a:cs typeface="Arial" pitchFamily="34" charset="0"/>
+              </a:rPr>
+              <a:t>lo_0</a:t>
+            </a:r>
+          </a:p>
+        </p:txBody>
+      </p:sp>
+      <p:sp>
+        <p:nvSpPr>
+          <p:cNvPr id="17" name="Rectangle 16"/>
+          <p:cNvSpPr/>
+          <p:nvPr/>
+        </p:nvSpPr>
+        <p:spPr>
+          <a:xfrm>
+            <a:off x="2042319" y="228599"/>
+            <a:ext cx="381000" cy="146851"/>
+          </a:xfrm>
+          <a:prstGeom prst="rect">
+            <a:avLst/>
+          </a:prstGeom>
+          <a:noFill/>
+          <a:ln w="12700">
+            <a:noFill/>
+          </a:ln>
+        </p:spPr>
+        <p:style>
+          <a:lnRef idx="2">
+            <a:schemeClr val="accent1">
+              <a:shade val="50000"/>
+            </a:schemeClr>
+          </a:lnRef>
+          <a:fillRef idx="1">
+            <a:schemeClr val="accent1"/>
+          </a:fillRef>
+          <a:effectRef idx="0">
+            <a:schemeClr val="accent1"/>
+          </a:effectRef>
+          <a:fontRef idx="minor">
+            <a:schemeClr val="lt1"/>
+          </a:fontRef>
+        </p:style>
+        <p:txBody>
+          <a:bodyPr rtlCol="0" anchor="ctr"/>
+          <a:lstStyle/>
+          <a:p>
+            <a:pPr algn="ctr"/>
+            <a:r>
+              <a:rPr lang="en-US" sz="800" dirty="0" smtClean="0">
+                <a:solidFill>
+                  <a:schemeClr val="tx1"/>
+                </a:solidFill>
+                <a:latin typeface="Arial" pitchFamily="34" charset="0"/>
+                <a:cs typeface="Arial" pitchFamily="34" charset="0"/>
+              </a:rPr>
+              <a:t>lo_1</a:t>
+            </a:r>
+          </a:p>
+        </p:txBody>
+      </p:sp>
+      <p:sp>
+        <p:nvSpPr>
+          <p:cNvPr id="18" name="Rectangle 17"/>
+          <p:cNvSpPr/>
+          <p:nvPr/>
+        </p:nvSpPr>
+        <p:spPr>
+          <a:xfrm>
+            <a:off x="2422525" y="228599"/>
+            <a:ext cx="381000" cy="146851"/>
+          </a:xfrm>
+          <a:prstGeom prst="rect">
+            <a:avLst/>
+          </a:prstGeom>
+          <a:noFill/>
+          <a:ln w="12700">
+            <a:noFill/>
+          </a:ln>
+        </p:spPr>
+        <p:style>
+          <a:lnRef idx="2">
+            <a:schemeClr val="accent1">
+              <a:shade val="50000"/>
+            </a:schemeClr>
+          </a:lnRef>
+          <a:fillRef idx="1">
+            <a:schemeClr val="accent1"/>
+          </a:fillRef>
+          <a:effectRef idx="0">
+            <a:schemeClr val="accent1"/>
+          </a:effectRef>
+          <a:fontRef idx="minor">
+            <a:schemeClr val="lt1"/>
+          </a:fontRef>
+        </p:style>
+        <p:txBody>
+          <a:bodyPr rtlCol="0" anchor="ctr"/>
+          <a:lstStyle/>
+          <a:p>
+            <a:pPr algn="ctr"/>
+            <a:r>
+              <a:rPr lang="en-US" sz="800" dirty="0" smtClean="0">
+                <a:solidFill>
+                  <a:schemeClr val="tx1"/>
+                </a:solidFill>
+                <a:latin typeface="Arial" pitchFamily="34" charset="0"/>
+                <a:cs typeface="Arial" pitchFamily="34" charset="0"/>
+              </a:rPr>
+              <a:t>…</a:t>
+            </a:r>
+          </a:p>
+        </p:txBody>
+      </p:sp>
+      <p:sp>
+        <p:nvSpPr>
+          <p:cNvPr id="19" name="Rectangle 18"/>
+          <p:cNvSpPr/>
+          <p:nvPr/>
+        </p:nvSpPr>
+        <p:spPr>
+          <a:xfrm>
+            <a:off x="2802731" y="234148"/>
+            <a:ext cx="458788" cy="146851"/>
+          </a:xfrm>
+          <a:prstGeom prst="rect">
+            <a:avLst/>
+          </a:prstGeom>
+          <a:noFill/>
+          <a:ln w="12700">
+            <a:noFill/>
+          </a:ln>
+        </p:spPr>
+        <p:style>
+          <a:lnRef idx="2">
+            <a:schemeClr val="accent1">
+              <a:shade val="50000"/>
+            </a:schemeClr>
+          </a:lnRef>
+          <a:fillRef idx="1">
+            <a:schemeClr val="accent1"/>
+          </a:fillRef>
+          <a:effectRef idx="0">
+            <a:schemeClr val="accent1"/>
+          </a:effectRef>
+          <a:fontRef idx="minor">
+            <a:schemeClr val="lt1"/>
+          </a:fontRef>
+        </p:style>
+        <p:txBody>
+          <a:bodyPr rtlCol="0" anchor="ctr"/>
+          <a:lstStyle/>
+          <a:p>
+            <a:pPr algn="ctr"/>
+            <a:r>
+              <a:rPr lang="en-US" sz="800" dirty="0" err="1" smtClean="0">
+                <a:solidFill>
+                  <a:schemeClr val="tx1"/>
+                </a:solidFill>
+                <a:latin typeface="Arial" pitchFamily="34" charset="0"/>
+                <a:cs typeface="Arial" pitchFamily="34" charset="0"/>
+              </a:rPr>
+              <a:t>lo_M</a:t>
+            </a:r>
+            <a:endParaRPr lang="en-US" sz="800" dirty="0" smtClean="0">
+              <a:solidFill>
+                <a:schemeClr val="tx1"/>
+              </a:solidFill>
+              <a:latin typeface="Arial" pitchFamily="34" charset="0"/>
+              <a:cs typeface="Arial" pitchFamily="34" charset="0"/>
+            </a:endParaRPr>
+          </a:p>
+        </p:txBody>
+      </p:sp>
+      <p:cxnSp>
+        <p:nvCxnSpPr>
+          <p:cNvPr id="21" name="Straight Arrow Connector 20"/>
+          <p:cNvCxnSpPr>
+            <a:stCxn id="17" idx="2"/>
+            <a:endCxn id="2" idx="0"/>
+          </p:cNvCxnSpPr>
+          <p:nvPr/>
+        </p:nvCxnSpPr>
+        <p:spPr>
+          <a:xfrm>
+            <a:off x="2232819" y="375450"/>
+            <a:ext cx="213916" cy="302439"/>
+          </a:xfrm>
+          <a:prstGeom prst="straightConnector1">
+            <a:avLst/>
+          </a:prstGeom>
+          <a:ln w="12700">
+            <a:solidFill>
+              <a:schemeClr val="tx1"/>
+            </a:solidFill>
+            <a:headEnd type="none" w="med" len="med"/>
+            <a:tailEnd type="triangle" w="med" len="med"/>
+          </a:ln>
+        </p:spPr>
+        <p:style>
+          <a:lnRef idx="1">
+            <a:schemeClr val="accent1"/>
+          </a:lnRef>
+          <a:fillRef idx="0">
+            <a:schemeClr val="accent1"/>
+          </a:fillRef>
+          <a:effectRef idx="0">
+            <a:schemeClr val="accent1"/>
+          </a:effectRef>
+          <a:fontRef idx="minor">
+            <a:schemeClr val="tx1"/>
+          </a:fontRef>
+        </p:style>
+      </p:cxnSp>
+      <p:cxnSp>
+        <p:nvCxnSpPr>
+          <p:cNvPr id="24" name="Straight Arrow Connector 23"/>
+          <p:cNvCxnSpPr>
+            <a:stCxn id="19" idx="2"/>
+          </p:cNvCxnSpPr>
+          <p:nvPr/>
+        </p:nvCxnSpPr>
+        <p:spPr>
+          <a:xfrm flipH="1">
+            <a:off x="2613025" y="380999"/>
+            <a:ext cx="419100" cy="296890"/>
+          </a:xfrm>
+          <a:prstGeom prst="straightConnector1">
+            <a:avLst/>
+          </a:prstGeom>
+          <a:ln w="12700">
+            <a:solidFill>
+              <a:schemeClr val="tx1"/>
+            </a:solidFill>
+            <a:headEnd type="none" w="med" len="med"/>
+            <a:tailEnd type="triangle" w="med" len="med"/>
+          </a:ln>
+        </p:spPr>
+        <p:style>
+          <a:lnRef idx="1">
+            <a:schemeClr val="accent1"/>
+          </a:lnRef>
+          <a:fillRef idx="0">
+            <a:schemeClr val="accent1"/>
+          </a:fillRef>
+          <a:effectRef idx="0">
+            <a:schemeClr val="accent1"/>
+          </a:effectRef>
+          <a:fontRef idx="minor">
+            <a:schemeClr val="tx1"/>
+          </a:fontRef>
+        </p:style>
+      </p:cxnSp>
+      <p:cxnSp>
+        <p:nvCxnSpPr>
+          <p:cNvPr id="31" name="Straight Arrow Connector 30"/>
+          <p:cNvCxnSpPr>
+            <a:stCxn id="2" idx="2"/>
+          </p:cNvCxnSpPr>
+          <p:nvPr/>
+        </p:nvCxnSpPr>
+        <p:spPr>
+          <a:xfrm>
+            <a:off x="2446735" y="839238"/>
+            <a:ext cx="0" cy="218613"/>
+          </a:xfrm>
+          <a:prstGeom prst="straightConnector1">
+            <a:avLst/>
+          </a:prstGeom>
+          <a:ln w="12700">
+            <a:solidFill>
+              <a:schemeClr val="tx1"/>
+            </a:solidFill>
+            <a:headEnd type="none" w="med" len="med"/>
+            <a:tailEnd type="triangle" w="med" len="med"/>
+          </a:ln>
+        </p:spPr>
+        <p:style>
+          <a:lnRef idx="1">
+            <a:schemeClr val="accent1"/>
+          </a:lnRef>
+          <a:fillRef idx="0">
+            <a:schemeClr val="accent1"/>
+          </a:fillRef>
+          <a:effectRef idx="0">
+            <a:schemeClr val="accent1"/>
+          </a:effectRef>
+          <a:fontRef idx="minor">
+            <a:schemeClr val="tx1"/>
+          </a:fontRef>
+        </p:style>
+      </p:cxnSp>
+      <p:sp>
+        <p:nvSpPr>
+          <p:cNvPr id="25" name="Oval 24"/>
+          <p:cNvSpPr/>
+          <p:nvPr/>
+        </p:nvSpPr>
+        <p:spPr>
+          <a:xfrm>
+            <a:off x="2332037" y="1057849"/>
+            <a:ext cx="229394" cy="237549"/>
+          </a:xfrm>
+          <a:prstGeom prst="ellipse">
+            <a:avLst/>
+          </a:prstGeom>
+          <a:solidFill>
+            <a:srgbClr val="FFFFCC"/>
+          </a:solidFill>
+          <a:ln w="12700">
+            <a:solidFill>
+              <a:schemeClr val="tx1"/>
+            </a:solidFill>
+          </a:ln>
+        </p:spPr>
+        <p:style>
+          <a:lnRef idx="2">
+            <a:schemeClr val="accent1">
+              <a:shade val="50000"/>
+            </a:schemeClr>
+          </a:lnRef>
+          <a:fillRef idx="1">
+            <a:schemeClr val="accent1"/>
+          </a:fillRef>
+          <a:effectRef idx="0">
+            <a:schemeClr val="accent1"/>
+          </a:effectRef>
+          <a:fontRef idx="minor">
+            <a:schemeClr val="lt1"/>
+          </a:fontRef>
+        </p:style>
+        <p:txBody>
+          <a:bodyPr rtlCol="0" anchor="ctr"/>
+          <a:lstStyle/>
+          <a:p>
+            <a:pPr algn="ctr"/>
+            <a:r>
+              <a:rPr lang="en-US" sz="800" dirty="0">
+                <a:solidFill>
+                  <a:schemeClr val="tx1"/>
+                </a:solidFill>
+                <a:latin typeface="Arial" pitchFamily="34" charset="0"/>
+                <a:cs typeface="Arial" pitchFamily="34" charset="0"/>
+              </a:rPr>
+              <a:t>−</a:t>
+            </a:r>
+          </a:p>
+        </p:txBody>
+      </p:sp>
+      <p:cxnSp>
+        <p:nvCxnSpPr>
+          <p:cNvPr id="38" name="Straight Arrow Connector 37"/>
+          <p:cNvCxnSpPr/>
+          <p:nvPr/>
+        </p:nvCxnSpPr>
+        <p:spPr>
+          <a:xfrm>
+            <a:off x="2042319" y="1176623"/>
+            <a:ext cx="289718" cy="0"/>
+          </a:xfrm>
+          <a:prstGeom prst="straightConnector1">
+            <a:avLst/>
+          </a:prstGeom>
+          <a:ln w="12700">
+            <a:solidFill>
+              <a:schemeClr val="tx1"/>
+            </a:solidFill>
+            <a:headEnd type="none" w="med" len="med"/>
+            <a:tailEnd type="triangle" w="med" len="med"/>
+          </a:ln>
+        </p:spPr>
+        <p:style>
+          <a:lnRef idx="1">
+            <a:schemeClr val="accent1"/>
+          </a:lnRef>
+          <a:fillRef idx="0">
+            <a:schemeClr val="accent1"/>
+          </a:fillRef>
+          <a:effectRef idx="0">
+            <a:schemeClr val="accent1"/>
+          </a:effectRef>
+          <a:fontRef idx="minor">
+            <a:schemeClr val="tx1"/>
+          </a:fontRef>
+        </p:style>
+      </p:cxnSp>
+      <p:sp>
+        <p:nvSpPr>
+          <p:cNvPr id="41" name="Rectangle 40"/>
+          <p:cNvSpPr/>
+          <p:nvPr/>
+        </p:nvSpPr>
+        <p:spPr>
+          <a:xfrm>
+            <a:off x="1432719" y="1103197"/>
+            <a:ext cx="609600" cy="146851"/>
+          </a:xfrm>
+          <a:prstGeom prst="rect">
+            <a:avLst/>
+          </a:prstGeom>
+          <a:noFill/>
+          <a:ln w="12700">
+            <a:noFill/>
+          </a:ln>
+        </p:spPr>
+        <p:style>
+          <a:lnRef idx="2">
+            <a:schemeClr val="accent1">
+              <a:shade val="50000"/>
+            </a:schemeClr>
+          </a:lnRef>
+          <a:fillRef idx="1">
+            <a:schemeClr val="accent1"/>
+          </a:fillRef>
+          <a:effectRef idx="0">
+            <a:schemeClr val="accent1"/>
+          </a:effectRef>
+          <a:fontRef idx="minor">
+            <a:schemeClr val="lt1"/>
+          </a:fontRef>
+        </p:style>
+        <p:txBody>
+          <a:bodyPr rtlCol="0" anchor="ctr"/>
+          <a:lstStyle/>
+          <a:p>
+            <a:pPr algn="ctr"/>
+            <a:r>
+              <a:rPr lang="en-US" sz="800" dirty="0" err="1" smtClean="0">
+                <a:solidFill>
+                  <a:schemeClr val="tx1"/>
+                </a:solidFill>
+                <a:latin typeface="Arial" pitchFamily="34" charset="0"/>
+                <a:cs typeface="Arial" pitchFamily="34" charset="0"/>
+              </a:rPr>
+              <a:t>c_M,min</a:t>
+            </a:r>
+            <a:endParaRPr lang="en-US" sz="800" dirty="0" smtClean="0">
+              <a:solidFill>
+                <a:schemeClr val="tx1"/>
+              </a:solidFill>
+              <a:latin typeface="Arial" pitchFamily="34" charset="0"/>
+              <a:cs typeface="Arial" pitchFamily="34" charset="0"/>
+            </a:endParaRPr>
+          </a:p>
+        </p:txBody>
+      </p:sp>
+      <p:cxnSp>
+        <p:nvCxnSpPr>
+          <p:cNvPr id="42" name="Straight Arrow Connector 41"/>
+          <p:cNvCxnSpPr/>
+          <p:nvPr/>
+        </p:nvCxnSpPr>
+        <p:spPr>
+          <a:xfrm>
+            <a:off x="2446735" y="1295398"/>
+            <a:ext cx="0" cy="218613"/>
+          </a:xfrm>
+          <a:prstGeom prst="straightConnector1">
+            <a:avLst/>
+          </a:prstGeom>
+          <a:ln w="12700">
+            <a:solidFill>
+              <a:schemeClr val="tx1"/>
+            </a:solidFill>
+            <a:headEnd type="none" w="med" len="med"/>
+            <a:tailEnd type="triangle" w="med" len="med"/>
+          </a:ln>
+        </p:spPr>
+        <p:style>
+          <a:lnRef idx="1">
+            <a:schemeClr val="accent1"/>
+          </a:lnRef>
+          <a:fillRef idx="0">
+            <a:schemeClr val="accent1"/>
+          </a:fillRef>
+          <a:effectRef idx="0">
+            <a:schemeClr val="accent1"/>
+          </a:effectRef>
+          <a:fontRef idx="minor">
+            <a:schemeClr val="tx1"/>
+          </a:fontRef>
+        </p:style>
+      </p:cxnSp>
+      <p:sp>
+        <p:nvSpPr>
+          <p:cNvPr id="43" name="Oval 42"/>
+          <p:cNvSpPr/>
+          <p:nvPr/>
+        </p:nvSpPr>
+        <p:spPr>
+          <a:xfrm>
+            <a:off x="1812925" y="2286000"/>
+            <a:ext cx="229394" cy="237549"/>
+          </a:xfrm>
+          <a:prstGeom prst="ellipse">
+            <a:avLst/>
+          </a:prstGeom>
+          <a:solidFill>
+            <a:srgbClr val="FFFFCC"/>
+          </a:solidFill>
+          <a:ln w="12700">
+            <a:solidFill>
+              <a:schemeClr val="tx1"/>
+            </a:solidFill>
+          </a:ln>
+        </p:spPr>
+        <p:style>
+          <a:lnRef idx="2">
+            <a:schemeClr val="accent1">
+              <a:shade val="50000"/>
+            </a:schemeClr>
+          </a:lnRef>
+          <a:fillRef idx="1">
+            <a:schemeClr val="accent1"/>
+          </a:fillRef>
+          <a:effectRef idx="0">
+            <a:schemeClr val="accent1"/>
+          </a:effectRef>
+          <a:fontRef idx="minor">
+            <a:schemeClr val="lt1"/>
+          </a:fontRef>
+        </p:style>
+        <p:txBody>
+          <a:bodyPr rtlCol="0" anchor="ctr"/>
+          <a:lstStyle/>
+          <a:p>
+            <a:pPr algn="ctr"/>
+            <a:r>
+              <a:rPr lang="en-US" sz="800" dirty="0">
+                <a:solidFill>
+                  <a:schemeClr val="tx1"/>
+                </a:solidFill>
+                <a:latin typeface="Arial" pitchFamily="34" charset="0"/>
+                <a:cs typeface="Arial" pitchFamily="34" charset="0"/>
+              </a:rPr>
+              <a:t>+</a:t>
+            </a:r>
+          </a:p>
+        </p:txBody>
+      </p:sp>
+      <p:cxnSp>
+        <p:nvCxnSpPr>
+          <p:cNvPr id="45" name="Straight Arrow Connector 44"/>
+          <p:cNvCxnSpPr>
+            <a:endCxn id="43" idx="0"/>
+          </p:cNvCxnSpPr>
+          <p:nvPr/>
+        </p:nvCxnSpPr>
+        <p:spPr>
+          <a:xfrm flipH="1">
+            <a:off x="1927622" y="1905000"/>
+            <a:ext cx="264517" cy="381000"/>
+          </a:xfrm>
+          <a:prstGeom prst="straightConnector1">
+            <a:avLst/>
+          </a:prstGeom>
+          <a:ln w="12700">
+            <a:solidFill>
+              <a:schemeClr val="tx1"/>
+            </a:solidFill>
+            <a:headEnd type="none" w="med" len="med"/>
+            <a:tailEnd type="triangle" w="med" len="med"/>
+          </a:ln>
+        </p:spPr>
+        <p:style>
+          <a:lnRef idx="1">
+            <a:schemeClr val="accent1"/>
+          </a:lnRef>
+          <a:fillRef idx="0">
+            <a:schemeClr val="accent1"/>
+          </a:fillRef>
+          <a:effectRef idx="0">
+            <a:schemeClr val="accent1"/>
+          </a:effectRef>
+          <a:fontRef idx="minor">
+            <a:schemeClr val="tx1"/>
+          </a:fontRef>
+        </p:style>
+      </p:cxnSp>
+      <p:sp>
+        <p:nvSpPr>
+          <p:cNvPr id="48" name="Rectangle 47"/>
+          <p:cNvSpPr/>
+          <p:nvPr/>
+        </p:nvSpPr>
+        <p:spPr>
+          <a:xfrm>
+            <a:off x="1622822" y="1960447"/>
+            <a:ext cx="609600" cy="146851"/>
+          </a:xfrm>
+          <a:prstGeom prst="rect">
+            <a:avLst/>
+          </a:prstGeom>
+          <a:noFill/>
+          <a:ln w="12700">
+            <a:noFill/>
+          </a:ln>
+        </p:spPr>
+        <p:style>
+          <a:lnRef idx="2">
+            <a:schemeClr val="accent1">
+              <a:shade val="50000"/>
+            </a:schemeClr>
+          </a:lnRef>
+          <a:fillRef idx="1">
+            <a:schemeClr val="accent1"/>
+          </a:fillRef>
+          <a:effectRef idx="0">
+            <a:schemeClr val="accent1"/>
+          </a:effectRef>
+          <a:fontRef idx="minor">
+            <a:schemeClr val="lt1"/>
+          </a:fontRef>
+        </p:style>
+        <p:txBody>
+          <a:bodyPr rtlCol="0" anchor="ctr"/>
+          <a:lstStyle/>
+          <a:p>
+            <a:pPr algn="ctr"/>
+            <a:r>
+              <a:rPr lang="en-US" sz="800" dirty="0" smtClean="0">
+                <a:solidFill>
+                  <a:schemeClr val="tx1"/>
+                </a:solidFill>
+                <a:latin typeface="Arial" pitchFamily="34" charset="0"/>
+                <a:cs typeface="Arial" pitchFamily="34" charset="0"/>
+              </a:rPr>
+              <a:t>yes</a:t>
+            </a:r>
+          </a:p>
+        </p:txBody>
+      </p:sp>
+      <p:sp>
+        <p:nvSpPr>
+          <p:cNvPr id="49" name="Rectangle 48"/>
+          <p:cNvSpPr/>
+          <p:nvPr/>
+        </p:nvSpPr>
+        <p:spPr>
+          <a:xfrm>
+            <a:off x="975519" y="2331348"/>
+            <a:ext cx="609600" cy="146851"/>
+          </a:xfrm>
+          <a:prstGeom prst="rect">
+            <a:avLst/>
+          </a:prstGeom>
+          <a:noFill/>
+          <a:ln w="12700">
+            <a:noFill/>
+          </a:ln>
+        </p:spPr>
+        <p:style>
+          <a:lnRef idx="2">
+            <a:schemeClr val="accent1">
+              <a:shade val="50000"/>
+            </a:schemeClr>
+          </a:lnRef>
+          <a:fillRef idx="1">
+            <a:schemeClr val="accent1"/>
+          </a:fillRef>
+          <a:effectRef idx="0">
+            <a:schemeClr val="accent1"/>
+          </a:effectRef>
+          <a:fontRef idx="minor">
+            <a:schemeClr val="lt1"/>
+          </a:fontRef>
+        </p:style>
+        <p:txBody>
+          <a:bodyPr rtlCol="0" anchor="ctr"/>
+          <a:lstStyle/>
+          <a:p>
+            <a:pPr algn="ctr"/>
+            <a:r>
+              <a:rPr lang="en-US" sz="800" dirty="0" err="1" smtClean="0">
+                <a:solidFill>
+                  <a:schemeClr val="tx1"/>
+                </a:solidFill>
+                <a:latin typeface="Arial" pitchFamily="34" charset="0"/>
+                <a:cs typeface="Arial" pitchFamily="34" charset="0"/>
+              </a:rPr>
+              <a:t>t_M,max</a:t>
+            </a:r>
+            <a:endParaRPr lang="en-US" sz="800" dirty="0" smtClean="0">
+              <a:solidFill>
+                <a:schemeClr val="tx1"/>
+              </a:solidFill>
+              <a:latin typeface="Arial" pitchFamily="34" charset="0"/>
+              <a:cs typeface="Arial" pitchFamily="34" charset="0"/>
+            </a:endParaRPr>
+          </a:p>
+        </p:txBody>
+      </p:sp>
+      <p:cxnSp>
+        <p:nvCxnSpPr>
+          <p:cNvPr id="50" name="Straight Arrow Connector 49"/>
+          <p:cNvCxnSpPr/>
+          <p:nvPr/>
+        </p:nvCxnSpPr>
+        <p:spPr>
+          <a:xfrm>
+            <a:off x="1523207" y="2405059"/>
+            <a:ext cx="289718" cy="0"/>
+          </a:xfrm>
+          <a:prstGeom prst="straightConnector1">
+            <a:avLst/>
+          </a:prstGeom>
+          <a:ln w="12700">
+            <a:solidFill>
+              <a:schemeClr val="tx1"/>
+            </a:solidFill>
+            <a:headEnd type="none" w="med" len="med"/>
+            <a:tailEnd type="triangle" w="med" len="med"/>
+          </a:ln>
+        </p:spPr>
+        <p:style>
+          <a:lnRef idx="1">
+            <a:schemeClr val="accent1"/>
+          </a:lnRef>
+          <a:fillRef idx="0">
+            <a:schemeClr val="accent1"/>
+          </a:fillRef>
+          <a:effectRef idx="0">
+            <a:schemeClr val="accent1"/>
+          </a:effectRef>
+          <a:fontRef idx="minor">
+            <a:schemeClr val="tx1"/>
+          </a:fontRef>
+        </p:style>
+      </p:cxnSp>
+      <p:sp>
+        <p:nvSpPr>
+          <p:cNvPr id="51" name="Rectangle 50"/>
+          <p:cNvSpPr/>
+          <p:nvPr/>
+        </p:nvSpPr>
+        <p:spPr>
+          <a:xfrm>
+            <a:off x="2804319" y="1981198"/>
+            <a:ext cx="304800" cy="146851"/>
+          </a:xfrm>
+          <a:prstGeom prst="rect">
+            <a:avLst/>
+          </a:prstGeom>
+          <a:noFill/>
+          <a:ln w="12700">
+            <a:noFill/>
+          </a:ln>
+        </p:spPr>
+        <p:style>
+          <a:lnRef idx="2">
+            <a:schemeClr val="accent1">
+              <a:shade val="50000"/>
+            </a:schemeClr>
+          </a:lnRef>
+          <a:fillRef idx="1">
+            <a:schemeClr val="accent1"/>
+          </a:fillRef>
+          <a:effectRef idx="0">
+            <a:schemeClr val="accent1"/>
+          </a:effectRef>
+          <a:fontRef idx="minor">
+            <a:schemeClr val="lt1"/>
+          </a:fontRef>
+        </p:style>
+        <p:txBody>
+          <a:bodyPr rtlCol="0" anchor="ctr"/>
+          <a:lstStyle/>
+          <a:p>
+            <a:pPr algn="ctr"/>
+            <a:r>
+              <a:rPr lang="en-US" sz="800" dirty="0" smtClean="0">
+                <a:solidFill>
+                  <a:schemeClr val="tx1"/>
+                </a:solidFill>
+                <a:latin typeface="Arial" pitchFamily="34" charset="0"/>
+                <a:cs typeface="Arial" pitchFamily="34" charset="0"/>
+              </a:rPr>
+              <a:t>no</a:t>
+            </a:r>
+          </a:p>
+        </p:txBody>
+      </p:sp>
+      <p:cxnSp>
+        <p:nvCxnSpPr>
+          <p:cNvPr id="52" name="Straight Arrow Connector 51"/>
+          <p:cNvCxnSpPr/>
+          <p:nvPr/>
+        </p:nvCxnSpPr>
+        <p:spPr>
+          <a:xfrm>
+            <a:off x="2446735" y="2819400"/>
+            <a:ext cx="9922" cy="347659"/>
+          </a:xfrm>
+          <a:prstGeom prst="straightConnector1">
+            <a:avLst/>
+          </a:prstGeom>
+          <a:ln w="12700">
+            <a:solidFill>
+              <a:schemeClr val="tx1"/>
+            </a:solidFill>
+            <a:headEnd type="none" w="med" len="med"/>
+            <a:tailEnd type="triangle" w="med" len="med"/>
+          </a:ln>
+        </p:spPr>
+        <p:style>
+          <a:lnRef idx="1">
+            <a:schemeClr val="accent1"/>
+          </a:lnRef>
+          <a:fillRef idx="0">
+            <a:schemeClr val="accent1"/>
+          </a:fillRef>
+          <a:effectRef idx="0">
+            <a:schemeClr val="accent1"/>
+          </a:effectRef>
+          <a:fontRef idx="minor">
+            <a:schemeClr val="tx1"/>
+          </a:fontRef>
+        </p:style>
+      </p:cxnSp>
+      <p:cxnSp>
+        <p:nvCxnSpPr>
+          <p:cNvPr id="55" name="Straight Arrow Connector 54"/>
+          <p:cNvCxnSpPr>
+            <a:stCxn id="43" idx="4"/>
+          </p:cNvCxnSpPr>
+          <p:nvPr/>
+        </p:nvCxnSpPr>
+        <p:spPr>
+          <a:xfrm>
+            <a:off x="1927622" y="2523549"/>
+            <a:ext cx="529035" cy="295851"/>
+          </a:xfrm>
+          <a:prstGeom prst="straightConnector1">
+            <a:avLst/>
+          </a:prstGeom>
+          <a:ln w="12700">
+            <a:solidFill>
+              <a:schemeClr val="tx1"/>
+            </a:solidFill>
+            <a:headEnd type="none" w="med" len="med"/>
+            <a:tailEnd type="none" w="med" len="med"/>
+          </a:ln>
+        </p:spPr>
+        <p:style>
+          <a:lnRef idx="1">
+            <a:schemeClr val="accent1"/>
+          </a:lnRef>
+          <a:fillRef idx="0">
+            <a:schemeClr val="accent1"/>
+          </a:fillRef>
+          <a:effectRef idx="0">
+            <a:schemeClr val="accent1"/>
+          </a:effectRef>
+          <a:fontRef idx="minor">
+            <a:schemeClr val="tx1"/>
+          </a:fontRef>
+        </p:style>
+      </p:cxnSp>
+      <p:cxnSp>
+        <p:nvCxnSpPr>
+          <p:cNvPr id="60" name="Straight Arrow Connector 59"/>
+          <p:cNvCxnSpPr/>
+          <p:nvPr/>
+        </p:nvCxnSpPr>
+        <p:spPr>
+          <a:xfrm flipV="1">
+            <a:off x="2446735" y="2590800"/>
+            <a:ext cx="375840" cy="228600"/>
+          </a:xfrm>
+          <a:prstGeom prst="straightConnector1">
+            <a:avLst/>
+          </a:prstGeom>
+          <a:ln w="12700">
+            <a:solidFill>
+              <a:schemeClr val="tx1"/>
+            </a:solidFill>
+            <a:headEnd type="none" w="med" len="med"/>
+            <a:tailEnd type="none" w="med" len="med"/>
+          </a:ln>
+        </p:spPr>
+        <p:style>
+          <a:lnRef idx="1">
+            <a:schemeClr val="accent1"/>
+          </a:lnRef>
+          <a:fillRef idx="0">
+            <a:schemeClr val="accent1"/>
+          </a:fillRef>
+          <a:effectRef idx="0">
+            <a:schemeClr val="accent1"/>
+          </a:effectRef>
+          <a:fontRef idx="minor">
+            <a:schemeClr val="tx1"/>
+          </a:fontRef>
+        </p:style>
+      </p:cxnSp>
+      <p:cxnSp>
+        <p:nvCxnSpPr>
+          <p:cNvPr id="63" name="Straight Arrow Connector 62"/>
+          <p:cNvCxnSpPr/>
+          <p:nvPr/>
+        </p:nvCxnSpPr>
+        <p:spPr>
+          <a:xfrm flipV="1">
+            <a:off x="2822575" y="1828800"/>
+            <a:ext cx="0" cy="762000"/>
+          </a:xfrm>
+          <a:prstGeom prst="straightConnector1">
+            <a:avLst/>
+          </a:prstGeom>
+          <a:ln w="12700">
+            <a:solidFill>
+              <a:schemeClr val="tx1"/>
+            </a:solidFill>
+            <a:headEnd type="none" w="med" len="med"/>
+            <a:tailEnd type="none" w="med" len="med"/>
+          </a:ln>
+        </p:spPr>
+        <p:style>
+          <a:lnRef idx="1">
+            <a:schemeClr val="accent1"/>
+          </a:lnRef>
+          <a:fillRef idx="0">
+            <a:schemeClr val="accent1"/>
+          </a:fillRef>
+          <a:effectRef idx="0">
+            <a:schemeClr val="accent1"/>
+          </a:effectRef>
+          <a:fontRef idx="minor">
+            <a:schemeClr val="tx1"/>
+          </a:fontRef>
+        </p:style>
+      </p:cxnSp>
+      <p:sp>
+        <p:nvSpPr>
+          <p:cNvPr id="29" name="Diamond 28"/>
+          <p:cNvSpPr/>
+          <p:nvPr/>
+        </p:nvSpPr>
+        <p:spPr>
+          <a:xfrm>
+            <a:off x="1738114" y="1514009"/>
+            <a:ext cx="1417242" cy="467189"/>
+          </a:xfrm>
+          <a:prstGeom prst="diamond">
+            <a:avLst/>
+          </a:prstGeom>
+          <a:solidFill>
+            <a:srgbClr val="FFFFCC"/>
+          </a:solidFill>
+          <a:ln w="12700">
+            <a:solidFill>
+              <a:schemeClr val="tx1"/>
+            </a:solidFill>
+          </a:ln>
+        </p:spPr>
+        <p:style>
+          <a:lnRef idx="2">
+            <a:schemeClr val="accent1">
+              <a:shade val="50000"/>
+            </a:schemeClr>
+          </a:lnRef>
+          <a:fillRef idx="1">
+            <a:schemeClr val="accent1"/>
+          </a:fillRef>
+          <a:effectRef idx="0">
+            <a:schemeClr val="accent1"/>
+          </a:effectRef>
+          <a:fontRef idx="minor">
+            <a:schemeClr val="lt1"/>
+          </a:fontRef>
+        </p:style>
+        <p:txBody>
+          <a:bodyPr rtlCol="0" anchor="ctr"/>
+          <a:lstStyle/>
+          <a:p>
+            <a:pPr algn="ctr"/>
+            <a:r>
+              <a:rPr lang="en-US" sz="800" dirty="0" smtClean="0">
+                <a:solidFill>
+                  <a:schemeClr val="tx1"/>
+                </a:solidFill>
+                <a:latin typeface="Arial" pitchFamily="34" charset="0"/>
+                <a:cs typeface="Arial" pitchFamily="34" charset="0"/>
+              </a:rPr>
+              <a:t>forwarded instruction?</a:t>
+            </a:r>
+            <a:endParaRPr lang="en-US" sz="800" dirty="0">
+              <a:solidFill>
+                <a:schemeClr val="tx1"/>
+              </a:solidFill>
+              <a:latin typeface="Arial" pitchFamily="34" charset="0"/>
+              <a:cs typeface="Arial" pitchFamily="34" charset="0"/>
+            </a:endParaRPr>
+          </a:p>
+        </p:txBody>
+      </p:sp>
+      <p:sp>
+        <p:nvSpPr>
+          <p:cNvPr id="68" name="Rectangle 67"/>
+          <p:cNvSpPr/>
+          <p:nvPr/>
+        </p:nvSpPr>
+        <p:spPr>
+          <a:xfrm>
+            <a:off x="2420144" y="2819400"/>
+            <a:ext cx="804862" cy="146851"/>
+          </a:xfrm>
+          <a:prstGeom prst="rect">
+            <a:avLst/>
+          </a:prstGeom>
+          <a:noFill/>
+          <a:ln w="12700">
+            <a:noFill/>
+          </a:ln>
+        </p:spPr>
+        <p:style>
+          <a:lnRef idx="2">
+            <a:schemeClr val="accent1">
+              <a:shade val="50000"/>
+            </a:schemeClr>
+          </a:lnRef>
+          <a:fillRef idx="1">
+            <a:schemeClr val="accent1"/>
+          </a:fillRef>
+          <a:effectRef idx="0">
+            <a:schemeClr val="accent1"/>
+          </a:effectRef>
+          <a:fontRef idx="minor">
+            <a:schemeClr val="lt1"/>
+          </a:fontRef>
+        </p:style>
+        <p:txBody>
+          <a:bodyPr rtlCol="0" anchor="ctr"/>
+          <a:lstStyle/>
+          <a:p>
+            <a:pPr algn="ctr"/>
+            <a:r>
+              <a:rPr lang="en-US" sz="800" dirty="0" smtClean="0">
+                <a:solidFill>
+                  <a:schemeClr val="tx1"/>
+                </a:solidFill>
+                <a:latin typeface="Arial" pitchFamily="34" charset="0"/>
+                <a:cs typeface="Arial" pitchFamily="34" charset="0"/>
+              </a:rPr>
+              <a:t>li + delta </a:t>
+            </a:r>
+            <a:r>
+              <a:rPr lang="en-US" sz="800" dirty="0" err="1" smtClean="0">
+                <a:solidFill>
+                  <a:schemeClr val="tx1"/>
+                </a:solidFill>
+                <a:latin typeface="Arial" pitchFamily="34" charset="0"/>
+                <a:cs typeface="Arial" pitchFamily="34" charset="0"/>
+              </a:rPr>
+              <a:t>l_M</a:t>
+            </a:r>
+            <a:endParaRPr lang="en-US" sz="800" dirty="0" smtClean="0">
+              <a:solidFill>
+                <a:schemeClr val="tx1"/>
+              </a:solidFill>
+              <a:latin typeface="Arial" pitchFamily="34" charset="0"/>
+              <a:cs typeface="Arial" pitchFamily="34" charset="0"/>
+            </a:endParaRPr>
+          </a:p>
+        </p:txBody>
+      </p:sp>
+      <p:sp>
+        <p:nvSpPr>
+          <p:cNvPr id="69" name="Rectangle 68"/>
+          <p:cNvSpPr/>
+          <p:nvPr/>
+        </p:nvSpPr>
+        <p:spPr>
+          <a:xfrm>
+            <a:off x="1947863" y="3167059"/>
+            <a:ext cx="1008856" cy="795341"/>
+          </a:xfrm>
+          <a:prstGeom prst="rect">
+            <a:avLst/>
+          </a:prstGeom>
+          <a:solidFill>
+            <a:srgbClr val="FFFFCC"/>
+          </a:solidFill>
+          <a:ln w="12700">
+            <a:solidFill>
+              <a:schemeClr val="tx1"/>
+            </a:solidFill>
+          </a:ln>
+        </p:spPr>
+        <p:style>
+          <a:lnRef idx="2">
+            <a:schemeClr val="accent1">
+              <a:shade val="50000"/>
+            </a:schemeClr>
+          </a:lnRef>
+          <a:fillRef idx="1">
+            <a:schemeClr val="accent1"/>
+          </a:fillRef>
+          <a:effectRef idx="0">
+            <a:schemeClr val="accent1"/>
+          </a:effectRef>
+          <a:fontRef idx="minor">
+            <a:schemeClr val="lt1"/>
+          </a:fontRef>
+        </p:style>
+        <p:txBody>
+          <a:bodyPr rtlCol="0" anchor="ctr"/>
+          <a:lstStyle/>
+          <a:p>
+            <a:pPr algn="ctr"/>
+            <a:r>
+              <a:rPr lang="en-US" sz="800" dirty="0" smtClean="0">
+                <a:solidFill>
+                  <a:schemeClr val="tx1"/>
+                </a:solidFill>
+                <a:latin typeface="Arial" pitchFamily="34" charset="0"/>
+                <a:cs typeface="Arial" pitchFamily="34" charset="0"/>
+              </a:rPr>
+              <a:t>bound(0, </a:t>
+            </a:r>
+            <a:r>
+              <a:rPr lang="en-US" sz="800" dirty="0" err="1" smtClean="0">
+                <a:solidFill>
+                  <a:schemeClr val="tx1"/>
+                </a:solidFill>
+                <a:latin typeface="Arial" pitchFamily="34" charset="0"/>
+                <a:cs typeface="Arial" pitchFamily="34" charset="0"/>
+              </a:rPr>
+              <a:t>l_max</a:t>
+            </a:r>
+            <a:r>
+              <a:rPr lang="en-US" sz="800" dirty="0" smtClean="0">
+                <a:solidFill>
+                  <a:schemeClr val="tx1"/>
+                </a:solidFill>
+                <a:latin typeface="Arial" pitchFamily="34" charset="0"/>
+                <a:cs typeface="Arial" pitchFamily="34" charset="0"/>
+              </a:rPr>
+              <a:t>)</a:t>
+            </a:r>
+          </a:p>
+          <a:p>
+            <a:pPr algn="ctr"/>
+            <a:endParaRPr lang="en-US" sz="800" dirty="0">
+              <a:solidFill>
+                <a:schemeClr val="tx1"/>
+              </a:solidFill>
+              <a:latin typeface="Arial" pitchFamily="34" charset="0"/>
+              <a:cs typeface="Arial" pitchFamily="34" charset="0"/>
+            </a:endParaRPr>
+          </a:p>
+          <a:p>
+            <a:pPr algn="ctr"/>
+            <a:endParaRPr lang="en-US" sz="800" dirty="0" smtClean="0">
+              <a:solidFill>
+                <a:schemeClr val="tx1"/>
+              </a:solidFill>
+              <a:latin typeface="Arial" pitchFamily="34" charset="0"/>
+              <a:cs typeface="Arial" pitchFamily="34" charset="0"/>
+            </a:endParaRPr>
+          </a:p>
+          <a:p>
+            <a:pPr algn="ctr"/>
+            <a:endParaRPr lang="en-US" sz="800" dirty="0">
+              <a:solidFill>
+                <a:schemeClr val="tx1"/>
+              </a:solidFill>
+              <a:latin typeface="Arial" pitchFamily="34" charset="0"/>
+              <a:cs typeface="Arial" pitchFamily="34" charset="0"/>
+            </a:endParaRPr>
+          </a:p>
+          <a:p>
+            <a:pPr algn="ctr"/>
+            <a:endParaRPr lang="en-US" sz="800" dirty="0" smtClean="0">
+              <a:solidFill>
+                <a:schemeClr val="tx1"/>
+              </a:solidFill>
+              <a:latin typeface="Arial" pitchFamily="34" charset="0"/>
+              <a:cs typeface="Arial" pitchFamily="34" charset="0"/>
+            </a:endParaRPr>
+          </a:p>
+          <a:p>
+            <a:pPr algn="ctr"/>
+            <a:endParaRPr lang="en-US" sz="800" dirty="0" smtClean="0">
+              <a:solidFill>
+                <a:schemeClr val="tx1"/>
+              </a:solidFill>
+              <a:latin typeface="Arial" pitchFamily="34" charset="0"/>
+              <a:cs typeface="Arial" pitchFamily="34" charset="0"/>
+            </a:endParaRPr>
+          </a:p>
+        </p:txBody>
+      </p:sp>
+      <p:cxnSp>
+        <p:nvCxnSpPr>
+          <p:cNvPr id="72" name="Straight Arrow Connector 71"/>
+          <p:cNvCxnSpPr/>
+          <p:nvPr/>
+        </p:nvCxnSpPr>
+        <p:spPr>
+          <a:xfrm flipH="1">
+            <a:off x="2027238" y="3810000"/>
+            <a:ext cx="246856" cy="0"/>
+          </a:xfrm>
+          <a:prstGeom prst="straightConnector1">
+            <a:avLst/>
+          </a:prstGeom>
+          <a:ln w="12700">
+            <a:solidFill>
+              <a:schemeClr val="tx1"/>
+            </a:solidFill>
+            <a:headEnd type="none" w="med" len="med"/>
+            <a:tailEnd type="none" w="med" len="med"/>
+          </a:ln>
+        </p:spPr>
+        <p:style>
+          <a:lnRef idx="1">
+            <a:schemeClr val="accent1"/>
+          </a:lnRef>
+          <a:fillRef idx="0">
+            <a:schemeClr val="accent1"/>
+          </a:fillRef>
+          <a:effectRef idx="0">
+            <a:schemeClr val="accent1"/>
+          </a:effectRef>
+          <a:fontRef idx="minor">
+            <a:schemeClr val="tx1"/>
+          </a:fontRef>
+        </p:style>
+      </p:cxnSp>
+      <p:cxnSp>
+        <p:nvCxnSpPr>
+          <p:cNvPr id="74" name="Straight Arrow Connector 73"/>
+          <p:cNvCxnSpPr/>
+          <p:nvPr/>
+        </p:nvCxnSpPr>
+        <p:spPr>
+          <a:xfrm flipH="1">
+            <a:off x="2274094" y="3564729"/>
+            <a:ext cx="225425" cy="245271"/>
+          </a:xfrm>
+          <a:prstGeom prst="straightConnector1">
+            <a:avLst/>
+          </a:prstGeom>
+          <a:ln w="12700">
+            <a:solidFill>
+              <a:schemeClr val="tx1"/>
+            </a:solidFill>
+            <a:headEnd type="none" w="med" len="med"/>
+            <a:tailEnd type="none" w="med" len="med"/>
+          </a:ln>
+        </p:spPr>
+        <p:style>
+          <a:lnRef idx="1">
+            <a:schemeClr val="accent1"/>
+          </a:lnRef>
+          <a:fillRef idx="0">
+            <a:schemeClr val="accent1"/>
+          </a:fillRef>
+          <a:effectRef idx="0">
+            <a:schemeClr val="accent1"/>
+          </a:effectRef>
+          <a:fontRef idx="minor">
+            <a:schemeClr val="tx1"/>
+          </a:fontRef>
+        </p:style>
+      </p:cxnSp>
+      <p:cxnSp>
+        <p:nvCxnSpPr>
+          <p:cNvPr id="77" name="Straight Arrow Connector 76"/>
+          <p:cNvCxnSpPr/>
+          <p:nvPr/>
+        </p:nvCxnSpPr>
+        <p:spPr>
+          <a:xfrm flipH="1">
+            <a:off x="2499519" y="3564729"/>
+            <a:ext cx="323056" cy="0"/>
+          </a:xfrm>
+          <a:prstGeom prst="straightConnector1">
+            <a:avLst/>
+          </a:prstGeom>
+          <a:ln w="12700">
+            <a:solidFill>
+              <a:schemeClr val="tx1"/>
+            </a:solidFill>
+            <a:headEnd type="none" w="med" len="med"/>
+            <a:tailEnd type="none" w="med" len="med"/>
+          </a:ln>
+        </p:spPr>
+        <p:style>
+          <a:lnRef idx="1">
+            <a:schemeClr val="accent1"/>
+          </a:lnRef>
+          <a:fillRef idx="0">
+            <a:schemeClr val="accent1"/>
+          </a:fillRef>
+          <a:effectRef idx="0">
+            <a:schemeClr val="accent1"/>
+          </a:effectRef>
+          <a:fontRef idx="minor">
+            <a:schemeClr val="tx1"/>
+          </a:fontRef>
+        </p:style>
+      </p:cxnSp>
+      <p:cxnSp>
+        <p:nvCxnSpPr>
+          <p:cNvPr id="79" name="Straight Arrow Connector 78"/>
+          <p:cNvCxnSpPr/>
+          <p:nvPr/>
+        </p:nvCxnSpPr>
+        <p:spPr>
+          <a:xfrm>
+            <a:off x="2456657" y="3962400"/>
+            <a:ext cx="9922" cy="533400"/>
+          </a:xfrm>
+          <a:prstGeom prst="straightConnector1">
+            <a:avLst/>
+          </a:prstGeom>
+          <a:ln w="12700">
+            <a:solidFill>
+              <a:schemeClr val="tx1"/>
+            </a:solidFill>
+            <a:headEnd type="none" w="med" len="med"/>
+            <a:tailEnd type="triangle" w="med" len="med"/>
+          </a:ln>
+        </p:spPr>
+        <p:style>
+          <a:lnRef idx="1">
+            <a:schemeClr val="accent1"/>
+          </a:lnRef>
+          <a:fillRef idx="0">
+            <a:schemeClr val="accent1"/>
+          </a:fillRef>
+          <a:effectRef idx="0">
+            <a:schemeClr val="accent1"/>
+          </a:effectRef>
+          <a:fontRef idx="minor">
+            <a:schemeClr val="tx1"/>
+          </a:fontRef>
+        </p:style>
+      </p:cxnSp>
+      <p:sp>
+        <p:nvSpPr>
+          <p:cNvPr id="80" name="Rectangle 79"/>
+          <p:cNvSpPr/>
+          <p:nvPr/>
+        </p:nvSpPr>
+        <p:spPr>
+          <a:xfrm>
+            <a:off x="2393553" y="4062802"/>
+            <a:ext cx="337740" cy="146851"/>
+          </a:xfrm>
+          <a:prstGeom prst="rect">
+            <a:avLst/>
+          </a:prstGeom>
+          <a:noFill/>
+          <a:ln w="12700">
+            <a:noFill/>
+          </a:ln>
+        </p:spPr>
+        <p:style>
+          <a:lnRef idx="2">
+            <a:schemeClr val="accent1">
+              <a:shade val="50000"/>
+            </a:schemeClr>
+          </a:lnRef>
+          <a:fillRef idx="1">
+            <a:schemeClr val="accent1"/>
+          </a:fillRef>
+          <a:effectRef idx="0">
+            <a:schemeClr val="accent1"/>
+          </a:effectRef>
+          <a:fontRef idx="minor">
+            <a:schemeClr val="lt1"/>
+          </a:fontRef>
+        </p:style>
+        <p:txBody>
+          <a:bodyPr rtlCol="0" anchor="ctr"/>
+          <a:lstStyle/>
+          <a:p>
+            <a:pPr algn="ctr"/>
+            <a:r>
+              <a:rPr lang="en-US" sz="800" dirty="0" smtClean="0">
+                <a:solidFill>
+                  <a:schemeClr val="tx1"/>
+                </a:solidFill>
+                <a:latin typeface="Arial" pitchFamily="34" charset="0"/>
+                <a:cs typeface="Arial" pitchFamily="34" charset="0"/>
+              </a:rPr>
+              <a:t>lo</a:t>
+            </a:r>
+          </a:p>
+        </p:txBody>
+      </p:sp>
+      <p:sp>
+        <p:nvSpPr>
+          <p:cNvPr id="85" name="Rectangle 84"/>
+          <p:cNvSpPr/>
+          <p:nvPr/>
+        </p:nvSpPr>
+        <p:spPr>
+          <a:xfrm>
+            <a:off x="3261519" y="2824162"/>
+            <a:ext cx="1008856" cy="795341"/>
+          </a:xfrm>
+          <a:prstGeom prst="rect">
+            <a:avLst/>
+          </a:prstGeom>
+          <a:solidFill>
+            <a:srgbClr val="FFFFCC"/>
+          </a:solidFill>
+          <a:ln w="12700">
+            <a:solidFill>
+              <a:schemeClr val="tx1"/>
+            </a:solidFill>
+          </a:ln>
+        </p:spPr>
+        <p:style>
+          <a:lnRef idx="2">
+            <a:schemeClr val="accent1">
+              <a:shade val="50000"/>
+            </a:schemeClr>
+          </a:lnRef>
+          <a:fillRef idx="1">
+            <a:schemeClr val="accent1"/>
+          </a:fillRef>
+          <a:effectRef idx="0">
+            <a:schemeClr val="accent1"/>
+          </a:effectRef>
+          <a:fontRef idx="minor">
+            <a:schemeClr val="lt1"/>
+          </a:fontRef>
+        </p:style>
+        <p:txBody>
+          <a:bodyPr rtlCol="0" anchor="ctr"/>
+          <a:lstStyle/>
+          <a:p>
+            <a:pPr algn="ctr"/>
+            <a:r>
+              <a:rPr lang="en-US" sz="800" dirty="0" smtClean="0">
+                <a:solidFill>
+                  <a:schemeClr val="tx1"/>
+                </a:solidFill>
+                <a:latin typeface="Arial" pitchFamily="34" charset="0"/>
+                <a:cs typeface="Arial" pitchFamily="34" charset="0"/>
+              </a:rPr>
+              <a:t>bound(0, ∞)</a:t>
+            </a:r>
+          </a:p>
+          <a:p>
+            <a:pPr algn="ctr"/>
+            <a:endParaRPr lang="en-US" sz="800" dirty="0">
+              <a:solidFill>
+                <a:schemeClr val="tx1"/>
+              </a:solidFill>
+              <a:latin typeface="Arial" pitchFamily="34" charset="0"/>
+              <a:cs typeface="Arial" pitchFamily="34" charset="0"/>
+            </a:endParaRPr>
+          </a:p>
+          <a:p>
+            <a:pPr algn="ctr"/>
+            <a:endParaRPr lang="en-US" sz="800" dirty="0" smtClean="0">
+              <a:solidFill>
+                <a:schemeClr val="tx1"/>
+              </a:solidFill>
+              <a:latin typeface="Arial" pitchFamily="34" charset="0"/>
+              <a:cs typeface="Arial" pitchFamily="34" charset="0"/>
+            </a:endParaRPr>
+          </a:p>
+          <a:p>
+            <a:pPr algn="ctr"/>
+            <a:endParaRPr lang="en-US" sz="800" dirty="0">
+              <a:solidFill>
+                <a:schemeClr val="tx1"/>
+              </a:solidFill>
+              <a:latin typeface="Arial" pitchFamily="34" charset="0"/>
+              <a:cs typeface="Arial" pitchFamily="34" charset="0"/>
+            </a:endParaRPr>
+          </a:p>
+          <a:p>
+            <a:pPr algn="ctr"/>
+            <a:endParaRPr lang="en-US" sz="800" dirty="0" smtClean="0">
+              <a:solidFill>
+                <a:schemeClr val="tx1"/>
+              </a:solidFill>
+              <a:latin typeface="Arial" pitchFamily="34" charset="0"/>
+              <a:cs typeface="Arial" pitchFamily="34" charset="0"/>
+            </a:endParaRPr>
+          </a:p>
+          <a:p>
+            <a:pPr algn="ctr"/>
+            <a:endParaRPr lang="en-US" sz="800" dirty="0" smtClean="0">
+              <a:solidFill>
+                <a:schemeClr val="tx1"/>
+              </a:solidFill>
+              <a:latin typeface="Arial" pitchFamily="34" charset="0"/>
+              <a:cs typeface="Arial" pitchFamily="34" charset="0"/>
+            </a:endParaRPr>
+          </a:p>
+        </p:txBody>
+      </p:sp>
+      <p:cxnSp>
+        <p:nvCxnSpPr>
+          <p:cNvPr id="86" name="Straight Arrow Connector 85"/>
+          <p:cNvCxnSpPr/>
+          <p:nvPr/>
+        </p:nvCxnSpPr>
+        <p:spPr>
+          <a:xfrm>
+            <a:off x="2456657" y="3048000"/>
+            <a:ext cx="804862" cy="0"/>
+          </a:xfrm>
+          <a:prstGeom prst="straightConnector1">
+            <a:avLst/>
+          </a:prstGeom>
+          <a:ln w="12700">
+            <a:solidFill>
+              <a:schemeClr val="tx1"/>
+            </a:solidFill>
+            <a:headEnd type="none" w="med" len="med"/>
+            <a:tailEnd type="triangle" w="med" len="med"/>
+          </a:ln>
+        </p:spPr>
+        <p:style>
+          <a:lnRef idx="1">
+            <a:schemeClr val="accent1"/>
+          </a:lnRef>
+          <a:fillRef idx="0">
+            <a:schemeClr val="accent1"/>
+          </a:fillRef>
+          <a:effectRef idx="0">
+            <a:schemeClr val="accent1"/>
+          </a:effectRef>
+          <a:fontRef idx="minor">
+            <a:schemeClr val="tx1"/>
+          </a:fontRef>
+        </p:style>
+      </p:cxnSp>
+      <p:cxnSp>
+        <p:nvCxnSpPr>
+          <p:cNvPr id="90" name="Straight Arrow Connector 89"/>
+          <p:cNvCxnSpPr/>
+          <p:nvPr/>
+        </p:nvCxnSpPr>
+        <p:spPr>
+          <a:xfrm flipH="1">
+            <a:off x="3366691" y="3429000"/>
+            <a:ext cx="399256" cy="0"/>
+          </a:xfrm>
+          <a:prstGeom prst="straightConnector1">
+            <a:avLst/>
+          </a:prstGeom>
+          <a:ln w="12700">
+            <a:solidFill>
+              <a:schemeClr val="tx1"/>
+            </a:solidFill>
+            <a:headEnd type="none" w="med" len="med"/>
+            <a:tailEnd type="none" w="med" len="med"/>
+          </a:ln>
+        </p:spPr>
+        <p:style>
+          <a:lnRef idx="1">
+            <a:schemeClr val="accent1"/>
+          </a:lnRef>
+          <a:fillRef idx="0">
+            <a:schemeClr val="accent1"/>
+          </a:fillRef>
+          <a:effectRef idx="0">
+            <a:schemeClr val="accent1"/>
+          </a:effectRef>
+          <a:fontRef idx="minor">
+            <a:schemeClr val="tx1"/>
+          </a:fontRef>
+        </p:style>
+      </p:cxnSp>
+      <p:cxnSp>
+        <p:nvCxnSpPr>
+          <p:cNvPr id="92" name="Straight Arrow Connector 91"/>
+          <p:cNvCxnSpPr/>
+          <p:nvPr/>
+        </p:nvCxnSpPr>
+        <p:spPr>
+          <a:xfrm flipH="1">
+            <a:off x="3765948" y="3064670"/>
+            <a:ext cx="333771" cy="364330"/>
+          </a:xfrm>
+          <a:prstGeom prst="straightConnector1">
+            <a:avLst/>
+          </a:prstGeom>
+          <a:ln w="12700">
+            <a:solidFill>
+              <a:schemeClr val="tx1"/>
+            </a:solidFill>
+            <a:headEnd type="none" w="med" len="med"/>
+            <a:tailEnd type="none" w="med" len="med"/>
+          </a:ln>
+        </p:spPr>
+        <p:style>
+          <a:lnRef idx="1">
+            <a:schemeClr val="accent1"/>
+          </a:lnRef>
+          <a:fillRef idx="0">
+            <a:schemeClr val="accent1"/>
+          </a:fillRef>
+          <a:effectRef idx="0">
+            <a:schemeClr val="accent1"/>
+          </a:effectRef>
+          <a:fontRef idx="minor">
+            <a:schemeClr val="tx1"/>
+          </a:fontRef>
+        </p:style>
+      </p:cxnSp>
+      <p:cxnSp>
+        <p:nvCxnSpPr>
+          <p:cNvPr id="94" name="Straight Arrow Connector 93"/>
+          <p:cNvCxnSpPr/>
+          <p:nvPr/>
+        </p:nvCxnSpPr>
+        <p:spPr>
+          <a:xfrm>
+            <a:off x="4270375" y="3050382"/>
+            <a:ext cx="743744" cy="0"/>
+          </a:xfrm>
+          <a:prstGeom prst="straightConnector1">
+            <a:avLst/>
+          </a:prstGeom>
+          <a:ln w="12700">
+            <a:solidFill>
+              <a:schemeClr val="tx1"/>
+            </a:solidFill>
+            <a:headEnd type="none" w="med" len="med"/>
+            <a:tailEnd type="triangle" w="med" len="med"/>
+          </a:ln>
+        </p:spPr>
+        <p:style>
+          <a:lnRef idx="1">
+            <a:schemeClr val="accent1"/>
+          </a:lnRef>
+          <a:fillRef idx="0">
+            <a:schemeClr val="accent1"/>
+          </a:fillRef>
+          <a:effectRef idx="0">
+            <a:schemeClr val="accent1"/>
+          </a:effectRef>
+          <a:fontRef idx="minor">
+            <a:schemeClr val="tx1"/>
+          </a:fontRef>
+        </p:style>
+      </p:cxnSp>
+      <p:sp>
+        <p:nvSpPr>
+          <p:cNvPr id="96" name="Rectangle 95"/>
+          <p:cNvSpPr/>
+          <p:nvPr/>
+        </p:nvSpPr>
+        <p:spPr>
+          <a:xfrm>
+            <a:off x="4363839" y="2892825"/>
+            <a:ext cx="497880" cy="146851"/>
+          </a:xfrm>
+          <a:prstGeom prst="rect">
+            <a:avLst/>
+          </a:prstGeom>
+          <a:noFill/>
+          <a:ln w="12700">
+            <a:noFill/>
+          </a:ln>
+        </p:spPr>
+        <p:style>
+          <a:lnRef idx="2">
+            <a:schemeClr val="accent1">
+              <a:shade val="50000"/>
+            </a:schemeClr>
+          </a:lnRef>
+          <a:fillRef idx="1">
+            <a:schemeClr val="accent1"/>
+          </a:fillRef>
+          <a:effectRef idx="0">
+            <a:schemeClr val="accent1"/>
+          </a:effectRef>
+          <a:fontRef idx="minor">
+            <a:schemeClr val="lt1"/>
+          </a:fontRef>
+        </p:style>
+        <p:txBody>
+          <a:bodyPr rtlCol="0" anchor="ctr"/>
+          <a:lstStyle/>
+          <a:p>
+            <a:pPr algn="ctr"/>
+            <a:r>
+              <a:rPr lang="en-US" sz="800" dirty="0" err="1" smtClean="0">
+                <a:solidFill>
+                  <a:schemeClr val="tx1"/>
+                </a:solidFill>
+                <a:latin typeface="Arial" pitchFamily="34" charset="0"/>
+                <a:cs typeface="Arial" pitchFamily="34" charset="0"/>
+              </a:rPr>
+              <a:t>s_M</a:t>
+            </a:r>
+            <a:endParaRPr lang="en-US" sz="800" dirty="0" smtClean="0">
+              <a:solidFill>
+                <a:schemeClr val="tx1"/>
+              </a:solidFill>
+              <a:latin typeface="Arial" pitchFamily="34" charset="0"/>
+              <a:cs typeface="Arial" pitchFamily="34" charset="0"/>
+            </a:endParaRPr>
+          </a:p>
+        </p:txBody>
+      </p:sp>
+      <p:sp>
+        <p:nvSpPr>
+          <p:cNvPr id="99" name="Rectangle 98"/>
+          <p:cNvSpPr/>
+          <p:nvPr/>
+        </p:nvSpPr>
+        <p:spPr>
+          <a:xfrm>
+            <a:off x="746126" y="597214"/>
+            <a:ext cx="3658393" cy="3669986"/>
+          </a:xfrm>
+          <a:prstGeom prst="rect">
+            <a:avLst/>
+          </a:prstGeom>
+          <a:noFill/>
+          <a:ln w="12700">
+            <a:solidFill>
+              <a:schemeClr val="tx1"/>
+            </a:solidFill>
+            <a:prstDash val="dash"/>
+          </a:ln>
+        </p:spPr>
+        <p:style>
+          <a:lnRef idx="2">
+            <a:schemeClr val="accent1">
+              <a:shade val="50000"/>
+            </a:schemeClr>
+          </a:lnRef>
+          <a:fillRef idx="1">
+            <a:schemeClr val="accent1"/>
+          </a:fillRef>
+          <a:effectRef idx="0">
+            <a:schemeClr val="accent1"/>
+          </a:effectRef>
+          <a:fontRef idx="minor">
+            <a:schemeClr val="lt1"/>
+          </a:fontRef>
+        </p:style>
+        <p:txBody>
+          <a:bodyPr rtlCol="0" anchor="ctr"/>
+          <a:lstStyle/>
+          <a:p>
+            <a:pPr algn="ctr"/>
+            <a:endParaRPr lang="en-US" sz="800" dirty="0" smtClean="0">
+              <a:solidFill>
+                <a:schemeClr val="tx1"/>
+              </a:solidFill>
+              <a:latin typeface="Arial" pitchFamily="34" charset="0"/>
+              <a:cs typeface="Arial" pitchFamily="34" charset="0"/>
+            </a:endParaRPr>
+          </a:p>
+        </p:txBody>
+      </p:sp>
+      <p:sp>
+        <p:nvSpPr>
+          <p:cNvPr id="100" name="Rectangle 99"/>
+          <p:cNvSpPr/>
+          <p:nvPr/>
+        </p:nvSpPr>
+        <p:spPr>
+          <a:xfrm>
+            <a:off x="743843" y="450363"/>
+            <a:ext cx="612676" cy="146851"/>
+          </a:xfrm>
+          <a:prstGeom prst="rect">
+            <a:avLst/>
+          </a:prstGeom>
+          <a:noFill/>
+          <a:ln w="12700">
+            <a:noFill/>
+          </a:ln>
+        </p:spPr>
+        <p:style>
+          <a:lnRef idx="2">
+            <a:schemeClr val="accent1">
+              <a:shade val="50000"/>
+            </a:schemeClr>
+          </a:lnRef>
+          <a:fillRef idx="1">
+            <a:schemeClr val="accent1"/>
+          </a:fillRef>
+          <a:effectRef idx="0">
+            <a:schemeClr val="accent1"/>
+          </a:effectRef>
+          <a:fontRef idx="minor">
+            <a:schemeClr val="lt1"/>
+          </a:fontRef>
+        </p:style>
+        <p:txBody>
+          <a:bodyPr rtlCol="0" anchor="ctr"/>
+          <a:lstStyle/>
+          <a:p>
+            <a:pPr algn="ctr"/>
+            <a:r>
+              <a:rPr lang="en-US" sz="800" dirty="0" smtClean="0">
+                <a:solidFill>
+                  <a:schemeClr val="tx1"/>
+                </a:solidFill>
+                <a:latin typeface="Arial" pitchFamily="34" charset="0"/>
+                <a:cs typeface="Arial" pitchFamily="34" charset="0"/>
+              </a:rPr>
+              <a:t>Node M</a:t>
+            </a:r>
+          </a:p>
+        </p:txBody>
+      </p:sp>
+    </p:spTree>
+    <p:extLst>
+      <p:ext uri="{BB962C8B-B14F-4D97-AF65-F5344CB8AC3E}">
+        <p14:creationId xmlns:p14="http://schemas.microsoft.com/office/powerpoint/2010/main" val="4169445255"/>
       </p:ext>
     </p:extLst>
   </p:cSld>

</xml_diff>